<commit_message>
Update Name and Address Parsing PPT.pptx
</commit_message>
<xml_diff>
--- a/Name and Address Parsing PPT.pptx
+++ b/Name and Address Parsing PPT.pptx
@@ -117,6 +117,11 @@
       </a:defRPr>
     </a:lvl9pPr>
   </p:defaultTextStyle>
+  <p:extLst>
+    <p:ext uri="{EFAFB233-063F-42B5-8137-9DF3F51BA10A}">
+      <p15:sldGuideLst xmlns:p15="http://schemas.microsoft.com/office/powerpoint/2012/main"/>
+    </p:ext>
+  </p:extLst>
 </p:presentation>
 </file>
 
@@ -125,7 +130,7 @@
   <pc:docChgLst>
     <pc:chgData name="Md onais Khan" userId="50438db196386884" providerId="LiveId" clId="{AE3B45B7-C3A9-4F17-AB2A-0CD75863C550}"/>
     <pc:docChg chg="undo custSel addSld delSld modSld">
-      <pc:chgData name="Md onais Khan" userId="50438db196386884" providerId="LiveId" clId="{AE3B45B7-C3A9-4F17-AB2A-0CD75863C550}" dt="2022-04-19T14:08:20.414" v="3457" actId="47"/>
+      <pc:chgData name="Md onais Khan" userId="50438db196386884" providerId="LiveId" clId="{AE3B45B7-C3A9-4F17-AB2A-0CD75863C550}" dt="2022-04-20T01:11:06.538" v="3466" actId="20577"/>
       <pc:docMkLst>
         <pc:docMk/>
       </pc:docMkLst>
@@ -314,7 +319,7 @@
         </pc:spChg>
       </pc:sldChg>
       <pc:sldChg chg="addSp modSp new mod">
-        <pc:chgData name="Md onais Khan" userId="50438db196386884" providerId="LiveId" clId="{AE3B45B7-C3A9-4F17-AB2A-0CD75863C550}" dt="2022-04-19T13:57:28.719" v="2094" actId="14100"/>
+        <pc:chgData name="Md onais Khan" userId="50438db196386884" providerId="LiveId" clId="{AE3B45B7-C3A9-4F17-AB2A-0CD75863C550}" dt="2022-04-20T01:11:06.538" v="3466" actId="20577"/>
         <pc:sldMkLst>
           <pc:docMk/>
           <pc:sldMk cId="2257238192" sldId="264"/>
@@ -328,7 +333,7 @@
           </ac:spMkLst>
         </pc:spChg>
         <pc:spChg chg="mod">
-          <ac:chgData name="Md onais Khan" userId="50438db196386884" providerId="LiveId" clId="{AE3B45B7-C3A9-4F17-AB2A-0CD75863C550}" dt="2022-04-19T13:56:44.541" v="2085" actId="20577"/>
+          <ac:chgData name="Md onais Khan" userId="50438db196386884" providerId="LiveId" clId="{AE3B45B7-C3A9-4F17-AB2A-0CD75863C550}" dt="2022-04-20T01:11:06.538" v="3466" actId="20577"/>
           <ac:spMkLst>
             <pc:docMk/>
             <pc:sldMk cId="2257238192" sldId="264"/>
@@ -8006,7 +8011,15 @@
           <a:p>
             <a:r>
               <a:rPr lang="en-IN" dirty="0"/>
-              <a:t>Now Suppose the Address Was Split and Tokenized as Follows</a:t>
+              <a:t>Now Suppose </a:t>
+            </a:r>
+            <a:r>
+              <a:rPr lang="en-IN"/>
+              <a:t>the Address and Name </a:t>
+            </a:r>
+            <a:r>
+              <a:rPr lang="en-IN" dirty="0"/>
+              <a:t>Was Split and Tokenized as Follows</a:t>
             </a:r>
           </a:p>
           <a:p>

</xml_diff>